<commit_message>
16 of 27 clear
</commit_message>
<xml_diff>
--- a/personal_guide/1과제 정리.pptx
+++ b/personal_guide/1과제 정리.pptx
@@ -22,6 +22,7 @@
     <p:sldId id="274" r:id="rId14"/>
     <p:sldId id="272" r:id="rId15"/>
     <p:sldId id="273" r:id="rId16"/>
+    <p:sldId id="275" r:id="rId17"/>
   </p:sldIdLst>
   <p:sldSz cx="12192000" cy="6858000"/>
   <p:notesSz cx="6858000" cy="9144000"/>
@@ -214,7 +215,7 @@
               <a:pPr lvl="0">
                 <a:defRPr/>
               </a:pPr>
-              <a:t>2024-05-13</a:t>
+              <a:t>2024-05-14</a:t>
             </a:fld>
             <a:endParaRPr lang="ko-KR" altLang="en-US"/>
           </a:p>
@@ -5591,6 +5592,182 @@
       <p:transition xmlns:mc="http://schemas.openxmlformats.org/markup-compatibility/2006" xmlns:hp="http://schemas.haansoft.com/office/presentation/8.0" mc:Ignorable="hp" hp:hslDur="500">
         <p:fade/>
       </p:transition>
+    </mc:Fallback>
+  </mc:AlternateContent>
+</p:sld>
+</file>
+
+<file path=ppt/slides/slide15.xml><?xml version="1.0" encoding="utf-8"?>
+<p:sld xmlns:r="http://schemas.openxmlformats.org/officeDocument/2006/relationships" xmlns:c="http://schemas.openxmlformats.org/drawingml/2006/chart" xmlns:a="http://schemas.openxmlformats.org/drawingml/2006/main" xmlns:dgm="http://schemas.openxmlformats.org/drawingml/2006/diagram" xmlns:dsp="http://schemas.microsoft.com/office/drawing/2008/diagram" xmlns:p="http://schemas.openxmlformats.org/presentationml/2006/main">
+  <p:cSld>
+    <p:spTree>
+      <p:nvGrpSpPr>
+        <p:cNvPr id="1" name=""/>
+        <p:cNvGrpSpPr/>
+        <p:nvPr/>
+      </p:nvGrpSpPr>
+      <p:grpSpPr>
+        <a:xfrm>
+          <a:off x="0" y="0"/>
+          <a:ext cx="0" cy="0"/>
+          <a:chOff x="0" y="0"/>
+          <a:chExt cx="0" cy="0"/>
+        </a:xfrm>
+      </p:grpSpPr>
+      <p:sp>
+        <p:nvSpPr>
+          <p:cNvPr id="2" name="제목 1"/>
+          <p:cNvSpPr>
+            <a:spLocks noGrp="1"/>
+          </p:cNvSpPr>
+          <p:nvPr>
+            <p:ph type="title" idx="0"/>
+          </p:nvPr>
+        </p:nvSpPr>
+        <p:spPr/>
+        <p:txBody>
+          <a:bodyPr/>
+          <a:lstStyle/>
+          <a:p>
+            <a:pPr lvl="0">
+              <a:defRPr/>
+            </a:pPr>
+            <a:r>
+              <a:rPr lang="ko-KR" altLang="en-US"/>
+              <a:t/>
+            </a:r>
+            <a:endParaRPr lang="ko-KR" altLang="en-US"/>
+          </a:p>
+        </p:txBody>
+      </p:sp>
+      <p:sp>
+        <p:nvSpPr>
+          <p:cNvPr id="3" name="내용 개체 틀 2"/>
+          <p:cNvSpPr>
+            <a:spLocks noGrp="1"/>
+          </p:cNvSpPr>
+          <p:nvPr>
+            <p:ph idx="1"/>
+          </p:nvPr>
+        </p:nvSpPr>
+        <p:spPr/>
+        <p:txBody>
+          <a:bodyPr/>
+          <a:lstStyle/>
+          <a:p>
+            <a:pPr lvl="0">
+              <a:defRPr/>
+            </a:pPr>
+            <a:r>
+              <a:rPr lang="ko-KR" altLang="en-US"/>
+              <a:t/>
+            </a:r>
+            <a:endParaRPr lang="ko-KR" altLang="en-US"/>
+          </a:p>
+        </p:txBody>
+      </p:sp>
+      <p:sp>
+        <p:nvSpPr>
+          <p:cNvPr id="4" name="Rectangle 6"/>
+          <p:cNvSpPr>
+            <a:spLocks noGrp="1" noChangeArrowheads="1"/>
+          </p:cNvSpPr>
+          <p:nvPr>
+            <p:ph type="sldNum" sz="quarter" idx="11"/>
+          </p:nvPr>
+        </p:nvSpPr>
+        <p:spPr/>
+        <p:txBody>
+          <a:bodyPr/>
+          <a:lstStyle/>
+          <a:p>
+            <a:pPr lvl="0">
+              <a:defRPr/>
+            </a:pPr>
+            <a:fld id="{515CC4ED-1449-4712-AE45-EBC263B4DD26}" type="slidenum">
+              <a:rPr lang="en-US" altLang="ko-KR">
+                <a:solidFill>
+                  <a:srgbClr val="1f497d">
+                    <a:lumMod val="50000"/>
+                  </a:srgbClr>
+                </a:solidFill>
+              </a:rPr>
+              <a:pPr lvl="0">
+                <a:defRPr/>
+              </a:pPr>
+              <a:t>15</a:t>
+            </a:fld>
+            <a:r>
+              <a:rPr lang="en-US" altLang="ko-KR">
+                <a:solidFill>
+                  <a:srgbClr val="1f497d">
+                    <a:lumMod val="50000"/>
+                  </a:srgbClr>
+                </a:solidFill>
+              </a:rPr>
+              <a:t> </a:t>
+            </a:r>
+            <a:endParaRPr lang="en-US" altLang="ko-KR">
+              <a:solidFill>
+                <a:srgbClr val="1f497d">
+                  <a:lumMod val="50000"/>
+                </a:srgbClr>
+              </a:solidFill>
+            </a:endParaRPr>
+          </a:p>
+        </p:txBody>
+      </p:sp>
+      <p:sp>
+        <p:nvSpPr>
+          <p:cNvPr id="5" name="Rectangle 5"/>
+          <p:cNvSpPr>
+            <a:spLocks noGrp="1" noChangeArrowheads="1"/>
+          </p:cNvSpPr>
+          <p:nvPr>
+            <p:ph type="ftr" sz="quarter" idx="3"/>
+          </p:nvPr>
+        </p:nvSpPr>
+        <p:spPr/>
+        <p:txBody>
+          <a:bodyPr/>
+          <a:lstStyle/>
+          <a:p>
+            <a:pPr lvl="0">
+              <a:spcBef>
+                <a:spcPct val="0"/>
+              </a:spcBef>
+              <a:spcAft>
+                <a:spcPct val="0"/>
+              </a:spcAft>
+              <a:defRPr/>
+            </a:pPr>
+            <a:r>
+              <a:rPr kumimoji="1" lang="en-US" altLang="ko-KR">
+                <a:solidFill>
+                  <a:prstClr val="black"/>
+                </a:solidFill>
+              </a:rPr>
+              <a:t>Youjip Won</a:t>
+            </a:r>
+            <a:endParaRPr kumimoji="1" lang="ko-KR" altLang="en-US">
+              <a:solidFill>
+                <a:prstClr val="black"/>
+              </a:solidFill>
+            </a:endParaRPr>
+          </a:p>
+        </p:txBody>
+      </p:sp>
+    </p:spTree>
+  </p:cSld>
+  <p:clrMapOvr>
+    <a:masterClrMapping/>
+  </p:clrMapOvr>
+  <mc:AlternateContent xmlns:mc="http://schemas.openxmlformats.org/markup-compatibility/2006">
+    <mc:Choice xmlns:p14="http://schemas.microsoft.com/office/powerpoint/2010/main" Requires="p14">
+      <p:transition xmlns:mc="http://schemas.openxmlformats.org/markup-compatibility/2006" xmlns:p14="http://schemas.microsoft.com/office/powerpoint/2010/main" mc:Ignorable="p14" p14:dur="500"/>
+    </mc:Choice>
+    <mc:Fallback>
+      <p:transition/>
     </mc:Fallback>
   </mc:AlternateContent>
 </p:sld>

</xml_diff>